<commit_message>
Update developer guide (#145)
* Remove DummySearchPage.html

* Move README.adoc to docs folder

* Update some diagrams

* Rename ModuleListCard to ModuleCard

* DeveloperGuide.adoc: Order and update information

* ModelClassComponentClassDiagram.pptx: Update to reflect project

* ModuleInfo.java: Reorder statements to follow standard

* Revert README.adoc to original place

* Remove trailing whitespace
</commit_message>
<xml_diff>
--- a/docs/diagrams/DeleteSequenceDiagram.pptx
+++ b/docs/diagrams/DeleteSequenceDiagram.pptx
@@ -208,7 +208,7 @@
           <a:p>
             <a:fld id="{F5CC4B3F-88C1-4FFA-B1B6-F41C21DC6924}" type="datetimeFigureOut">
               <a:rPr lang="en-US" smtClean="0"/>
-              <a:t>10/16/18</a:t>
+              <a:t>10/29/18</a:t>
             </a:fld>
             <a:endParaRPr lang="en-US"/>
           </a:p>
@@ -738,7 +738,7 @@
           <a:p>
             <a:fld id="{78C97017-6FC3-485B-9764-EAC9E56C1D49}" type="datetimeFigureOut">
               <a:rPr lang="en-US" smtClean="0"/>
-              <a:t>10/16/18</a:t>
+              <a:t>10/29/18</a:t>
             </a:fld>
             <a:endParaRPr lang="en-US"/>
           </a:p>
@@ -906,7 +906,7 @@
           <a:p>
             <a:fld id="{78C97017-6FC3-485B-9764-EAC9E56C1D49}" type="datetimeFigureOut">
               <a:rPr lang="en-US" smtClean="0"/>
-              <a:t>10/16/18</a:t>
+              <a:t>10/29/18</a:t>
             </a:fld>
             <a:endParaRPr lang="en-US"/>
           </a:p>
@@ -1084,7 +1084,7 @@
           <a:p>
             <a:fld id="{78C97017-6FC3-485B-9764-EAC9E56C1D49}" type="datetimeFigureOut">
               <a:rPr lang="en-US" smtClean="0"/>
-              <a:t>10/16/18</a:t>
+              <a:t>10/29/18</a:t>
             </a:fld>
             <a:endParaRPr lang="en-US"/>
           </a:p>
@@ -1252,7 +1252,7 @@
           <a:p>
             <a:fld id="{78C97017-6FC3-485B-9764-EAC9E56C1D49}" type="datetimeFigureOut">
               <a:rPr lang="en-US" smtClean="0"/>
-              <a:t>10/16/18</a:t>
+              <a:t>10/29/18</a:t>
             </a:fld>
             <a:endParaRPr lang="en-US"/>
           </a:p>
@@ -1497,7 +1497,7 @@
           <a:p>
             <a:fld id="{78C97017-6FC3-485B-9764-EAC9E56C1D49}" type="datetimeFigureOut">
               <a:rPr lang="en-US" smtClean="0"/>
-              <a:t>10/16/18</a:t>
+              <a:t>10/29/18</a:t>
             </a:fld>
             <a:endParaRPr lang="en-US"/>
           </a:p>
@@ -1782,7 +1782,7 @@
           <a:p>
             <a:fld id="{78C97017-6FC3-485B-9764-EAC9E56C1D49}" type="datetimeFigureOut">
               <a:rPr lang="en-US" smtClean="0"/>
-              <a:t>10/16/18</a:t>
+              <a:t>10/29/18</a:t>
             </a:fld>
             <a:endParaRPr lang="en-US"/>
           </a:p>
@@ -2201,7 +2201,7 @@
           <a:p>
             <a:fld id="{78C97017-6FC3-485B-9764-EAC9E56C1D49}" type="datetimeFigureOut">
               <a:rPr lang="en-US" smtClean="0"/>
-              <a:t>10/16/18</a:t>
+              <a:t>10/29/18</a:t>
             </a:fld>
             <a:endParaRPr lang="en-US"/>
           </a:p>
@@ -2318,7 +2318,7 @@
           <a:p>
             <a:fld id="{78C97017-6FC3-485B-9764-EAC9E56C1D49}" type="datetimeFigureOut">
               <a:rPr lang="en-US" smtClean="0"/>
-              <a:t>10/16/18</a:t>
+              <a:t>10/29/18</a:t>
             </a:fld>
             <a:endParaRPr lang="en-US"/>
           </a:p>
@@ -2413,7 +2413,7 @@
           <a:p>
             <a:fld id="{78C97017-6FC3-485B-9764-EAC9E56C1D49}" type="datetimeFigureOut">
               <a:rPr lang="en-US" smtClean="0"/>
-              <a:t>10/16/18</a:t>
+              <a:t>10/29/18</a:t>
             </a:fld>
             <a:endParaRPr lang="en-US"/>
           </a:p>
@@ -2688,7 +2688,7 @@
           <a:p>
             <a:fld id="{78C97017-6FC3-485B-9764-EAC9E56C1D49}" type="datetimeFigureOut">
               <a:rPr lang="en-US" smtClean="0"/>
-              <a:t>10/16/18</a:t>
+              <a:t>10/29/18</a:t>
             </a:fld>
             <a:endParaRPr lang="en-US"/>
           </a:p>
@@ -2940,7 +2940,7 @@
           <a:p>
             <a:fld id="{78C97017-6FC3-485B-9764-EAC9E56C1D49}" type="datetimeFigureOut">
               <a:rPr lang="en-US" smtClean="0"/>
-              <a:t>10/16/18</a:t>
+              <a:t>10/29/18</a:t>
             </a:fld>
             <a:endParaRPr lang="en-US"/>
           </a:p>
@@ -3151,7 +3151,7 @@
           <a:p>
             <a:fld id="{78C97017-6FC3-485B-9764-EAC9E56C1D49}" type="datetimeFigureOut">
               <a:rPr lang="en-US" smtClean="0"/>
-              <a:t>10/16/18</a:t>
+              <a:t>10/29/18</a:t>
             </a:fld>
             <a:endParaRPr lang="en-US"/>
           </a:p>
@@ -3534,8 +3534,8 @@
         </p:nvSpPr>
         <p:spPr>
           <a:xfrm>
-            <a:off x="5105400" y="1219200"/>
-            <a:ext cx="5052122" cy="4400926"/>
+            <a:off x="5105400" y="1219199"/>
+            <a:ext cx="5052122" cy="4930567"/>
           </a:xfrm>
           <a:prstGeom prst="roundRect">
             <a:avLst>
@@ -3595,8 +3595,8 @@
         </p:nvSpPr>
         <p:spPr>
           <a:xfrm>
-            <a:off x="-1048583" y="1263323"/>
-            <a:ext cx="6026386" cy="4343400"/>
+            <a:off x="-1981192" y="1263322"/>
+            <a:ext cx="6954302" cy="4886445"/>
           </a:xfrm>
           <a:prstGeom prst="roundRect">
             <a:avLst>
@@ -3656,7 +3656,7 @@
         </p:nvSpPr>
         <p:spPr>
           <a:xfrm>
-            <a:off x="-810708" y="1644251"/>
+            <a:off x="-1181569" y="1606374"/>
             <a:ext cx="1455629" cy="346760"/>
           </a:xfrm>
           <a:prstGeom prst="rect">
@@ -3725,8 +3725,8 @@
         </p:nvCxnSpPr>
         <p:spPr>
           <a:xfrm>
-            <a:off x="-82894" y="2007922"/>
-            <a:ext cx="0" cy="3481399"/>
+            <a:off x="-453755" y="1953134"/>
+            <a:ext cx="2" cy="4124040"/>
           </a:xfrm>
           <a:prstGeom prst="line">
             <a:avLst/>
@@ -3762,8 +3762,8 @@
         </p:nvSpPr>
         <p:spPr>
           <a:xfrm>
-            <a:off x="-154902" y="2358616"/>
-            <a:ext cx="152400" cy="2932689"/>
+            <a:off x="-525762" y="2358616"/>
+            <a:ext cx="152400" cy="3420217"/>
           </a:xfrm>
           <a:prstGeom prst="rect">
             <a:avLst/>
@@ -3809,8 +3809,8 @@
         </p:nvSpPr>
         <p:spPr>
           <a:xfrm>
-            <a:off x="2083214" y="1523327"/>
-            <a:ext cx="1219200" cy="467684"/>
+            <a:off x="889259" y="1439548"/>
+            <a:ext cx="1621173" cy="467684"/>
           </a:xfrm>
           <a:prstGeom prst="rect">
             <a:avLst/>
@@ -3850,18 +3850,31 @@
                   <a:schemeClr val="bg1"/>
                 </a:solidFill>
               </a:rPr>
-              <a:t>:Address</a:t>
-            </a:r>
-          </a:p>
-          <a:p>
-            <a:pPr algn="ctr"/>
+              <a:t>:</a:t>
+            </a:r>
             <a:r>
               <a:rPr lang="en-US" sz="1600" dirty="0" err="1">
                 <a:solidFill>
                   <a:schemeClr val="bg1"/>
                 </a:solidFill>
               </a:rPr>
-              <a:t>BookParser</a:t>
+              <a:t>ModulePlanner</a:t>
+            </a:r>
+            <a:endParaRPr lang="en-US" sz="1600" dirty="0">
+              <a:solidFill>
+                <a:schemeClr val="bg1"/>
+              </a:solidFill>
+            </a:endParaRPr>
+          </a:p>
+          <a:p>
+            <a:pPr algn="ctr"/>
+            <a:r>
+              <a:rPr lang="en-US" sz="1600" dirty="0">
+                <a:solidFill>
+                  <a:schemeClr val="bg1"/>
+                </a:solidFill>
+              </a:rPr>
+              <a:t>Parser</a:t>
             </a:r>
             <a:endParaRPr lang="en-SG" sz="1600" dirty="0">
               <a:solidFill>
@@ -3881,8 +3894,8 @@
         </p:nvCxnSpPr>
         <p:spPr>
           <a:xfrm>
-            <a:off x="2696613" y="2007922"/>
-            <a:ext cx="0" cy="1482984"/>
+            <a:off x="1683651" y="1907232"/>
+            <a:ext cx="0" cy="2579755"/>
           </a:xfrm>
           <a:prstGeom prst="line">
             <a:avLst/>
@@ -3918,8 +3931,8 @@
         </p:nvSpPr>
         <p:spPr>
           <a:xfrm>
-            <a:off x="2624606" y="2466115"/>
-            <a:ext cx="154408" cy="767790"/>
+            <a:off x="1611644" y="2466115"/>
+            <a:ext cx="154408" cy="1787652"/>
           </a:xfrm>
           <a:prstGeom prst="rect">
             <a:avLst/>
@@ -3973,8 +3986,8 @@
         </p:nvCxnSpPr>
         <p:spPr>
           <a:xfrm>
-            <a:off x="4248108" y="2713938"/>
-            <a:ext cx="0" cy="2644578"/>
+            <a:off x="4283211" y="3505200"/>
+            <a:ext cx="0" cy="2783386"/>
           </a:xfrm>
           <a:prstGeom prst="line">
             <a:avLst/>
@@ -4010,7 +4023,7 @@
         </p:nvSpPr>
         <p:spPr>
           <a:xfrm>
-            <a:off x="4171908" y="2713938"/>
+            <a:off x="4207011" y="3505200"/>
             <a:ext cx="152400" cy="276003"/>
           </a:xfrm>
           <a:prstGeom prst="rect">
@@ -4052,13 +4065,15 @@
       <p:cxnSp>
         <p:nvCxnSpPr>
           <p:cNvPr id="23" name="Straight Arrow Connector 22"/>
-          <p:cNvCxnSpPr/>
+          <p:cNvCxnSpPr>
+            <a:cxnSpLocks/>
+          </p:cNvCxnSpPr>
           <p:nvPr/>
         </p:nvCxnSpPr>
         <p:spPr>
           <a:xfrm>
-            <a:off x="-1274753" y="2362304"/>
-            <a:ext cx="1119851" cy="0"/>
+            <a:off x="-2133600" y="2358616"/>
+            <a:ext cx="1607838" cy="3688"/>
           </a:xfrm>
           <a:prstGeom prst="straightConnector1">
             <a:avLst/>
@@ -4093,8 +4108,8 @@
         </p:nvSpPr>
         <p:spPr>
           <a:xfrm>
-            <a:off x="-2305883" y="2079232"/>
-            <a:ext cx="2019300" cy="215444"/>
+            <a:off x="-2286000" y="2442389"/>
+            <a:ext cx="2019300" cy="430887"/>
           </a:xfrm>
           <a:prstGeom prst="rect">
             <a:avLst/>
@@ -4107,14 +4122,14 @@
           </a:bodyPr>
           <a:lstStyle/>
           <a:p>
-            <a:pPr algn="r"/>
+            <a:pPr algn="ctr"/>
             <a:r>
               <a:rPr lang="en-US" sz="1400" dirty="0">
                 <a:solidFill>
                   <a:srgbClr val="0070C0"/>
                 </a:solidFill>
               </a:rPr>
-              <a:t>execute(“delete MA1521”)</a:t>
+              <a:t>execute(“delete c/MA1521”)</a:t>
             </a:r>
           </a:p>
         </p:txBody>
@@ -4122,13 +4137,15 @@
       <p:cxnSp>
         <p:nvCxnSpPr>
           <p:cNvPr id="28" name="Straight Arrow Connector 27"/>
-          <p:cNvCxnSpPr/>
+          <p:cNvCxnSpPr>
+            <a:cxnSpLocks/>
+          </p:cNvCxnSpPr>
           <p:nvPr/>
         </p:nvCxnSpPr>
         <p:spPr>
-          <a:xfrm flipV="1">
-            <a:off x="2781998" y="2612645"/>
-            <a:ext cx="922392" cy="1"/>
+          <a:xfrm>
+            <a:off x="3318001" y="3291708"/>
+            <a:ext cx="421492" cy="1"/>
           </a:xfrm>
           <a:prstGeom prst="straightConnector1">
             <a:avLst/>
@@ -4163,7 +4180,7 @@
         </p:nvSpPr>
         <p:spPr>
           <a:xfrm>
-            <a:off x="1889447" y="3584376"/>
+            <a:off x="1381041" y="4696436"/>
             <a:ext cx="855809" cy="215444"/>
           </a:xfrm>
           <a:prstGeom prst="rect">
@@ -4198,13 +4215,15 @@
       <p:cxnSp>
         <p:nvCxnSpPr>
           <p:cNvPr id="34" name="Straight Arrow Connector 33"/>
-          <p:cNvCxnSpPr/>
+          <p:cNvCxnSpPr>
+            <a:cxnSpLocks/>
+          </p:cNvCxnSpPr>
           <p:nvPr/>
         </p:nvCxnSpPr>
         <p:spPr>
           <a:xfrm>
-            <a:off x="2755134" y="2978537"/>
-            <a:ext cx="1492974" cy="0"/>
+            <a:off x="3318001" y="3774897"/>
+            <a:ext cx="965210" cy="0"/>
           </a:xfrm>
           <a:prstGeom prst="straightConnector1">
             <a:avLst/>
@@ -4242,9 +4261,9 @@
           <p:nvPr/>
         </p:nvCxnSpPr>
         <p:spPr>
-          <a:xfrm>
-            <a:off x="-2502" y="3233905"/>
-            <a:ext cx="2687946" cy="0"/>
+          <a:xfrm flipV="1">
+            <a:off x="-373362" y="4254837"/>
+            <a:ext cx="1982768" cy="12363"/>
           </a:xfrm>
           <a:prstGeom prst="straightConnector1">
             <a:avLst/>
@@ -4276,13 +4295,15 @@
       <p:cxnSp>
         <p:nvCxnSpPr>
           <p:cNvPr id="37" name="Straight Arrow Connector 36"/>
-          <p:cNvCxnSpPr/>
+          <p:cNvCxnSpPr>
+            <a:cxnSpLocks/>
+          </p:cNvCxnSpPr>
           <p:nvPr/>
         </p:nvCxnSpPr>
         <p:spPr>
           <a:xfrm>
-            <a:off x="-1312854" y="5291305"/>
-            <a:ext cx="1196051" cy="0"/>
+            <a:off x="-2286000" y="5778833"/>
+            <a:ext cx="1844291" cy="0"/>
           </a:xfrm>
           <a:prstGeom prst="straightConnector1">
             <a:avLst/>
@@ -4319,8 +4340,8 @@
         </p:nvSpPr>
         <p:spPr>
           <a:xfrm>
-            <a:off x="4172514" y="3831618"/>
-            <a:ext cx="161322" cy="1307285"/>
+            <a:off x="4207617" y="4622880"/>
+            <a:ext cx="161322" cy="1064149"/>
           </a:xfrm>
           <a:prstGeom prst="rect">
             <a:avLst/>
@@ -4366,7 +4387,7 @@
         </p:nvSpPr>
         <p:spPr>
           <a:xfrm>
-            <a:off x="4097624" y="3848551"/>
+            <a:off x="3810000" y="4639813"/>
             <a:ext cx="1863602" cy="184666"/>
           </a:xfrm>
           <a:prstGeom prst="rect">
@@ -4409,7 +4430,7 @@
                   </a:schemeClr>
                 </a:solidFill>
               </a:rPr>
-              <a:t>(MA1521)</a:t>
+              <a:t>(m)</a:t>
             </a:r>
             <a:endParaRPr lang="en-US" sz="1200" dirty="0">
               <a:solidFill>
@@ -4427,8 +4448,8 @@
         </p:nvSpPr>
         <p:spPr>
           <a:xfrm>
-            <a:off x="-436553" y="2174178"/>
-            <a:ext cx="3097181" cy="215444"/>
+            <a:off x="-214300" y="2001851"/>
+            <a:ext cx="1777832" cy="430887"/>
           </a:xfrm>
           <a:prstGeom prst="rect">
             <a:avLst/>
@@ -4452,13 +4473,14 @@
             </a:lvl1pPr>
           </a:lstStyle>
           <a:p>
+            <a:pPr algn="ctr"/>
             <a:r>
               <a:rPr lang="en-US" dirty="0" err="1"/>
               <a:t>parseCommand</a:t>
             </a:r>
             <a:r>
               <a:rPr lang="en-US" dirty="0"/>
-              <a:t>(“delete MA1521”)</a:t>
+              <a:t>(“delete c/MA1521”)</a:t>
             </a:r>
           </a:p>
         </p:txBody>
@@ -4471,7 +4493,7 @@
         </p:nvSpPr>
         <p:spPr>
           <a:xfrm>
-            <a:off x="1918781" y="4891381"/>
+            <a:off x="1471580" y="5396299"/>
             <a:ext cx="621216" cy="215444"/>
           </a:xfrm>
           <a:prstGeom prst="rect">
@@ -4511,7 +4533,7 @@
         </p:nvSpPr>
         <p:spPr>
           <a:xfrm>
-            <a:off x="-1048583" y="5046206"/>
+            <a:off x="-1544346" y="5504021"/>
             <a:ext cx="762000" cy="215444"/>
           </a:xfrm>
           <a:prstGeom prst="rect">
@@ -4551,7 +4573,7 @@
         </p:nvSpPr>
         <p:spPr>
           <a:xfrm>
-            <a:off x="6939713" y="3668911"/>
+            <a:off x="6939713" y="4460173"/>
             <a:ext cx="1536113" cy="335427"/>
           </a:xfrm>
           <a:prstGeom prst="rect">
@@ -4618,7 +4640,7 @@
         </p:nvSpPr>
         <p:spPr>
           <a:xfrm>
-            <a:off x="7619480" y="4283143"/>
+            <a:off x="7619480" y="5074405"/>
             <a:ext cx="129933" cy="398562"/>
           </a:xfrm>
           <a:prstGeom prst="rect">
@@ -4665,7 +4687,7 @@
         </p:nvSpPr>
         <p:spPr>
           <a:xfrm>
-            <a:off x="1370818" y="3006098"/>
+            <a:off x="599791" y="4017507"/>
             <a:ext cx="220343" cy="215444"/>
           </a:xfrm>
           <a:prstGeom prst="rect">
@@ -4705,7 +4727,7 @@
         </p:nvSpPr>
         <p:spPr>
           <a:xfrm>
-            <a:off x="5539672" y="3462505"/>
+            <a:off x="5539672" y="4253767"/>
             <a:ext cx="841636" cy="300180"/>
           </a:xfrm>
           <a:prstGeom prst="rect">
@@ -4766,7 +4788,7 @@
         </p:nvCxnSpPr>
         <p:spPr>
           <a:xfrm flipH="1">
-            <a:off x="5976398" y="3753611"/>
+            <a:off x="5976398" y="4544873"/>
             <a:ext cx="3959" cy="1735710"/>
           </a:xfrm>
           <a:prstGeom prst="line">
@@ -4803,7 +4825,7 @@
         </p:nvSpPr>
         <p:spPr>
           <a:xfrm>
-            <a:off x="5877434" y="4058411"/>
+            <a:off x="5877434" y="4849673"/>
             <a:ext cx="168896" cy="775693"/>
           </a:xfrm>
           <a:prstGeom prst="rect">
@@ -4852,7 +4874,7 @@
         </p:nvCxnSpPr>
         <p:spPr>
           <a:xfrm>
-            <a:off x="4331781" y="4075649"/>
+            <a:off x="4331781" y="4866911"/>
             <a:ext cx="1545653" cy="0"/>
           </a:xfrm>
           <a:prstGeom prst="straightConnector1">
@@ -4888,7 +4910,7 @@
         </p:nvSpPr>
         <p:spPr>
           <a:xfrm>
-            <a:off x="4118906" y="5358516"/>
+            <a:off x="4154009" y="6288586"/>
             <a:ext cx="258404" cy="261610"/>
           </a:xfrm>
           <a:prstGeom prst="rect">
@@ -4897,7 +4919,7 @@
           <a:noFill/>
         </p:spPr>
         <p:txBody>
-          <a:bodyPr wrap="none" rtlCol="0">
+          <a:bodyPr wrap="square" rtlCol="0">
             <a:spAutoFit/>
           </a:bodyPr>
           <a:lstStyle/>
@@ -4921,7 +4943,7 @@
         </p:nvSpPr>
         <p:spPr>
           <a:xfrm>
-            <a:off x="3682002" y="2360573"/>
+            <a:off x="3717105" y="3039636"/>
             <a:ext cx="1093635" cy="461538"/>
           </a:xfrm>
           <a:prstGeom prst="rect">
@@ -4998,14 +5020,13 @@
           </p:cNvPr>
           <p:cNvCxnSpPr>
             <a:cxnSpLocks/>
-            <a:stCxn id="6" idx="3"/>
           </p:cNvCxnSpPr>
           <p:nvPr/>
         </p:nvCxnSpPr>
         <p:spPr>
-          <a:xfrm>
-            <a:off x="-2502" y="3824961"/>
-            <a:ext cx="4037338" cy="6659"/>
+          <a:xfrm flipV="1">
+            <a:off x="-370860" y="4633191"/>
+            <a:ext cx="4563689" cy="9715"/>
           </a:xfrm>
           <a:prstGeom prst="straightConnector1">
             <a:avLst/>
@@ -5047,9 +5068,9 @@
           <p:nvPr/>
         </p:nvCxnSpPr>
         <p:spPr>
-          <a:xfrm flipV="1">
-            <a:off x="-2502" y="2464225"/>
-            <a:ext cx="2613478" cy="1890"/>
+          <a:xfrm>
+            <a:off x="-373362" y="2466115"/>
+            <a:ext cx="1982768" cy="8997"/>
           </a:xfrm>
           <a:prstGeom prst="straightConnector1">
             <a:avLst/>
@@ -5091,9 +5112,9 @@
           <p:nvPr/>
         </p:nvCxnSpPr>
         <p:spPr>
-          <a:xfrm flipV="1">
-            <a:off x="2788" y="5136767"/>
-            <a:ext cx="4166753" cy="2136"/>
+          <a:xfrm>
+            <a:off x="-373362" y="5684893"/>
+            <a:ext cx="4616316" cy="0"/>
           </a:xfrm>
           <a:prstGeom prst="straightConnector1">
             <a:avLst/>
@@ -5138,8 +5159,8 @@
         </p:nvCxnSpPr>
         <p:spPr>
           <a:xfrm>
-            <a:off x="7689737" y="3971660"/>
-            <a:ext cx="17996" cy="1467648"/>
+            <a:off x="7689737" y="4762922"/>
+            <a:ext cx="0" cy="1517661"/>
           </a:xfrm>
           <a:prstGeom prst="line">
             <a:avLst/>
@@ -5177,7 +5198,7 @@
         </p:nvCxnSpPr>
         <p:spPr>
           <a:xfrm>
-            <a:off x="6033898" y="4283144"/>
+            <a:off x="6033898" y="5074406"/>
             <a:ext cx="1585582" cy="0"/>
           </a:xfrm>
           <a:prstGeom prst="straightConnector1">
@@ -5221,7 +5242,7 @@
         </p:nvCxnSpPr>
         <p:spPr>
           <a:xfrm flipV="1">
-            <a:off x="6033898" y="4672825"/>
+            <a:off x="6033898" y="5464087"/>
             <a:ext cx="1650549" cy="2"/>
           </a:xfrm>
           <a:prstGeom prst="straightConnector1">
@@ -5268,7 +5289,7 @@
         </p:nvCxnSpPr>
         <p:spPr>
           <a:xfrm>
-            <a:off x="4331781" y="4834104"/>
+            <a:off x="4331781" y="5625366"/>
             <a:ext cx="1630101" cy="0"/>
           </a:xfrm>
           <a:prstGeom prst="straightConnector1">
@@ -5312,7 +5333,7 @@
         </p:nvSpPr>
         <p:spPr>
           <a:xfrm>
-            <a:off x="5808826" y="4039839"/>
+            <a:off x="5562600" y="4831101"/>
             <a:ext cx="1863602" cy="184666"/>
           </a:xfrm>
           <a:prstGeom prst="rect">
@@ -5355,7 +5376,7 @@
                   </a:schemeClr>
                 </a:solidFill>
               </a:rPr>
-              <a:t>(MA1521)</a:t>
+              <a:t>(m)</a:t>
             </a:r>
             <a:endParaRPr lang="en-US" sz="1200" dirty="0">
               <a:solidFill>
@@ -5379,7 +5400,7 @@
         </p:nvSpPr>
         <p:spPr>
           <a:xfrm>
-            <a:off x="8859005" y="3695725"/>
+            <a:off x="8859005" y="4486987"/>
             <a:ext cx="1064621" cy="300180"/>
           </a:xfrm>
           <a:prstGeom prst="rect">
@@ -5446,7 +5467,7 @@
         </p:nvCxnSpPr>
         <p:spPr>
           <a:xfrm>
-            <a:off x="9372230" y="3995905"/>
+            <a:off x="9372230" y="4787167"/>
             <a:ext cx="17996" cy="1467648"/>
           </a:xfrm>
           <a:prstGeom prst="line">
@@ -5491,7 +5512,7 @@
         </p:nvCxnSpPr>
         <p:spPr>
           <a:xfrm>
-            <a:off x="7713826" y="4362668"/>
+            <a:off x="7713826" y="5153930"/>
             <a:ext cx="1602435" cy="0"/>
           </a:xfrm>
           <a:prstGeom prst="straightConnector1">
@@ -5533,7 +5554,7 @@
         </p:nvSpPr>
         <p:spPr>
           <a:xfrm>
-            <a:off x="9316261" y="4362668"/>
+            <a:off x="9316261" y="5153930"/>
             <a:ext cx="129933" cy="231871"/>
           </a:xfrm>
           <a:prstGeom prst="rect">
@@ -5588,7 +5609,7 @@
         </p:nvCxnSpPr>
         <p:spPr>
           <a:xfrm>
-            <a:off x="7737169" y="4594539"/>
+            <a:off x="7737169" y="5385801"/>
             <a:ext cx="1635061" cy="0"/>
           </a:xfrm>
           <a:prstGeom prst="straightConnector1">
@@ -5632,7 +5653,7 @@
         </p:nvSpPr>
         <p:spPr>
           <a:xfrm>
-            <a:off x="7763702" y="4148305"/>
+            <a:off x="7543800" y="4939567"/>
             <a:ext cx="1580544" cy="184666"/>
           </a:xfrm>
           <a:prstGeom prst="rect">
@@ -5675,13 +5696,482 @@
                   </a:schemeClr>
                 </a:solidFill>
               </a:rPr>
-              <a:t>(MA1521)</a:t>
+              <a:t>(m)</a:t>
             </a:r>
             <a:endParaRPr lang="en-US" sz="1200" dirty="0">
               <a:solidFill>
                 <a:srgbClr val="7030A0"/>
               </a:solidFill>
             </a:endParaRPr>
+          </a:p>
+        </p:txBody>
+      </p:sp>
+      <p:sp>
+        <p:nvSpPr>
+          <p:cNvPr id="59" name="Rectangle 62">
+            <a:extLst>
+              <a:ext uri="{FF2B5EF4-FFF2-40B4-BE49-F238E27FC236}">
+                <a16:creationId xmlns:a16="http://schemas.microsoft.com/office/drawing/2014/main" id="{A3516E7F-929D-1044-AD53-D34420B2DF72}"/>
+              </a:ext>
+            </a:extLst>
+          </p:cNvPr>
+          <p:cNvSpPr/>
+          <p:nvPr/>
+        </p:nvSpPr>
+        <p:spPr>
+          <a:xfrm>
+            <a:off x="2284413" y="2246731"/>
+            <a:ext cx="1669034" cy="432035"/>
+          </a:xfrm>
+          <a:prstGeom prst="rect">
+            <a:avLst/>
+          </a:prstGeom>
+          <a:solidFill>
+            <a:srgbClr val="0070C0"/>
+          </a:solidFill>
+          <a:ln w="19050">
+            <a:solidFill>
+              <a:srgbClr val="0070C0"/>
+            </a:solidFill>
+          </a:ln>
+          <a:effectLst/>
+        </p:spPr>
+        <p:style>
+          <a:lnRef idx="1">
+            <a:schemeClr val="accent2"/>
+          </a:lnRef>
+          <a:fillRef idx="2">
+            <a:schemeClr val="accent2"/>
+          </a:fillRef>
+          <a:effectRef idx="1">
+            <a:schemeClr val="accent2"/>
+          </a:effectRef>
+          <a:fontRef idx="minor">
+            <a:schemeClr val="dk1"/>
+          </a:fontRef>
+        </p:style>
+        <p:txBody>
+          <a:bodyPr rtlCol="0" anchor="ctr"/>
+          <a:lstStyle/>
+          <a:p>
+            <a:pPr algn="ctr"/>
+            <a:r>
+              <a:rPr lang="en-US" sz="1600" dirty="0">
+                <a:solidFill>
+                  <a:schemeClr val="bg1"/>
+                </a:solidFill>
+              </a:rPr>
+              <a:t>:</a:t>
+            </a:r>
+            <a:r>
+              <a:rPr lang="en-US" sz="1600" dirty="0" err="1">
+                <a:solidFill>
+                  <a:schemeClr val="bg1"/>
+                </a:solidFill>
+              </a:rPr>
+              <a:t>DeleteCommand</a:t>
+            </a:r>
+            <a:endParaRPr lang="en-US" sz="1600" dirty="0">
+              <a:solidFill>
+                <a:schemeClr val="bg1"/>
+              </a:solidFill>
+            </a:endParaRPr>
+          </a:p>
+          <a:p>
+            <a:pPr algn="ctr"/>
+            <a:r>
+              <a:rPr lang="en-US" sz="1600" dirty="0">
+                <a:solidFill>
+                  <a:schemeClr val="bg1"/>
+                </a:solidFill>
+              </a:rPr>
+              <a:t>Parser</a:t>
+            </a:r>
+            <a:endParaRPr lang="en-SG" sz="1600" dirty="0">
+              <a:solidFill>
+                <a:schemeClr val="bg1"/>
+              </a:solidFill>
+            </a:endParaRPr>
+          </a:p>
+        </p:txBody>
+      </p:sp>
+      <p:sp>
+        <p:nvSpPr>
+          <p:cNvPr id="62" name="Rectangle 61">
+            <a:extLst>
+              <a:ext uri="{FF2B5EF4-FFF2-40B4-BE49-F238E27FC236}">
+                <a16:creationId xmlns:a16="http://schemas.microsoft.com/office/drawing/2014/main" id="{380A9807-53FA-284A-8780-046F50BC0FB0}"/>
+              </a:ext>
+            </a:extLst>
+          </p:cNvPr>
+          <p:cNvSpPr/>
+          <p:nvPr/>
+        </p:nvSpPr>
+        <p:spPr>
+          <a:xfrm>
+            <a:off x="3147357" y="2696142"/>
+            <a:ext cx="205843" cy="123165"/>
+          </a:xfrm>
+          <a:prstGeom prst="rect">
+            <a:avLst/>
+          </a:prstGeom>
+          <a:solidFill>
+            <a:srgbClr val="0070C0"/>
+          </a:solidFill>
+          <a:ln>
+            <a:solidFill>
+              <a:srgbClr val="0070C0"/>
+            </a:solidFill>
+          </a:ln>
+          <a:effectLst/>
+        </p:spPr>
+        <p:style>
+          <a:lnRef idx="1">
+            <a:schemeClr val="accent3"/>
+          </a:lnRef>
+          <a:fillRef idx="2">
+            <a:schemeClr val="accent3"/>
+          </a:fillRef>
+          <a:effectRef idx="1">
+            <a:schemeClr val="accent3"/>
+          </a:effectRef>
+          <a:fontRef idx="minor">
+            <a:schemeClr val="dk1"/>
+          </a:fontRef>
+        </p:style>
+        <p:txBody>
+          <a:bodyPr rtlCol="0" anchor="ctr"/>
+          <a:lstStyle/>
+          <a:p>
+            <a:pPr algn="ctr"/>
+            <a:endParaRPr lang="en-SG" sz="1400"/>
+          </a:p>
+        </p:txBody>
+      </p:sp>
+      <p:cxnSp>
+        <p:nvCxnSpPr>
+          <p:cNvPr id="64" name="Straight Arrow Connector 63">
+            <a:extLst>
+              <a:ext uri="{FF2B5EF4-FFF2-40B4-BE49-F238E27FC236}">
+                <a16:creationId xmlns:a16="http://schemas.microsoft.com/office/drawing/2014/main" id="{AB10CC91-38BC-C44B-B6E1-AA0AC104D3A5}"/>
+              </a:ext>
+            </a:extLst>
+          </p:cNvPr>
+          <p:cNvCxnSpPr>
+            <a:cxnSpLocks/>
+            <a:endCxn id="59" idx="1"/>
+          </p:cNvCxnSpPr>
+          <p:nvPr/>
+        </p:nvCxnSpPr>
+        <p:spPr>
+          <a:xfrm>
+            <a:off x="1759554" y="2459944"/>
+            <a:ext cx="524859" cy="2805"/>
+          </a:xfrm>
+          <a:prstGeom prst="straightConnector1">
+            <a:avLst/>
+          </a:prstGeom>
+          <a:ln w="19050">
+            <a:solidFill>
+              <a:srgbClr val="0070C0"/>
+            </a:solidFill>
+            <a:tailEnd type="arrow"/>
+          </a:ln>
+        </p:spPr>
+        <p:style>
+          <a:lnRef idx="1">
+            <a:schemeClr val="accent1"/>
+          </a:lnRef>
+          <a:fillRef idx="0">
+            <a:schemeClr val="accent1"/>
+          </a:fillRef>
+          <a:effectRef idx="0">
+            <a:schemeClr val="accent1"/>
+          </a:effectRef>
+          <a:fontRef idx="minor">
+            <a:schemeClr val="tx1"/>
+          </a:fontRef>
+        </p:style>
+      </p:cxnSp>
+      <p:cxnSp>
+        <p:nvCxnSpPr>
+          <p:cNvPr id="68" name="Straight Arrow Connector 67">
+            <a:extLst>
+              <a:ext uri="{FF2B5EF4-FFF2-40B4-BE49-F238E27FC236}">
+                <a16:creationId xmlns:a16="http://schemas.microsoft.com/office/drawing/2014/main" id="{A8D3D560-488B-4849-B01B-AA1534B3F59C}"/>
+              </a:ext>
+            </a:extLst>
+          </p:cNvPr>
+          <p:cNvCxnSpPr>
+            <a:cxnSpLocks/>
+          </p:cNvCxnSpPr>
+          <p:nvPr/>
+        </p:nvCxnSpPr>
+        <p:spPr>
+          <a:xfrm flipV="1">
+            <a:off x="1755659" y="2814174"/>
+            <a:ext cx="1413025" cy="14566"/>
+          </a:xfrm>
+          <a:prstGeom prst="straightConnector1">
+            <a:avLst/>
+          </a:prstGeom>
+          <a:ln w="19050">
+            <a:solidFill>
+              <a:srgbClr val="0070C0"/>
+            </a:solidFill>
+            <a:prstDash val="sysDash"/>
+            <a:headEnd type="arrow" w="med" len="med"/>
+            <a:tailEnd type="none" w="med" len="med"/>
+          </a:ln>
+        </p:spPr>
+        <p:style>
+          <a:lnRef idx="1">
+            <a:schemeClr val="accent1"/>
+          </a:lnRef>
+          <a:fillRef idx="0">
+            <a:schemeClr val="accent1"/>
+          </a:fillRef>
+          <a:effectRef idx="0">
+            <a:schemeClr val="accent1"/>
+          </a:effectRef>
+          <a:fontRef idx="minor">
+            <a:schemeClr val="tx1"/>
+          </a:fontRef>
+        </p:style>
+      </p:cxnSp>
+      <p:cxnSp>
+        <p:nvCxnSpPr>
+          <p:cNvPr id="70" name="Straight Connector 69">
+            <a:extLst>
+              <a:ext uri="{FF2B5EF4-FFF2-40B4-BE49-F238E27FC236}">
+                <a16:creationId xmlns:a16="http://schemas.microsoft.com/office/drawing/2014/main" id="{D608FC27-FFD9-2142-B8CD-EB2A825FE602}"/>
+              </a:ext>
+            </a:extLst>
+          </p:cNvPr>
+          <p:cNvCxnSpPr>
+            <a:cxnSpLocks/>
+            <a:stCxn id="62" idx="2"/>
+          </p:cNvCxnSpPr>
+          <p:nvPr/>
+        </p:nvCxnSpPr>
+        <p:spPr>
+          <a:xfrm flipH="1">
+            <a:off x="3236406" y="2819307"/>
+            <a:ext cx="13873" cy="1733460"/>
+          </a:xfrm>
+          <a:prstGeom prst="line">
+            <a:avLst/>
+          </a:prstGeom>
+          <a:ln w="19050">
+            <a:solidFill>
+              <a:srgbClr val="0070C0"/>
+            </a:solidFill>
+            <a:prstDash val="sysDash"/>
+          </a:ln>
+          <a:effectLst/>
+        </p:spPr>
+        <p:style>
+          <a:lnRef idx="1">
+            <a:schemeClr val="accent1"/>
+          </a:lnRef>
+          <a:fillRef idx="2">
+            <a:schemeClr val="accent1"/>
+          </a:fillRef>
+          <a:effectRef idx="1">
+            <a:schemeClr val="accent1"/>
+          </a:effectRef>
+          <a:fontRef idx="minor">
+            <a:schemeClr val="dk1"/>
+          </a:fontRef>
+        </p:style>
+      </p:cxnSp>
+      <p:sp>
+        <p:nvSpPr>
+          <p:cNvPr id="71" name="Rectangle 70">
+            <a:extLst>
+              <a:ext uri="{FF2B5EF4-FFF2-40B4-BE49-F238E27FC236}">
+                <a16:creationId xmlns:a16="http://schemas.microsoft.com/office/drawing/2014/main" id="{F9A26E9A-C3E7-7F40-AE32-2584149A76BA}"/>
+              </a:ext>
+            </a:extLst>
+          </p:cNvPr>
+          <p:cNvSpPr/>
+          <p:nvPr/>
+        </p:nvSpPr>
+        <p:spPr>
+          <a:xfrm>
+            <a:off x="3156679" y="3027590"/>
+            <a:ext cx="161322" cy="869855"/>
+          </a:xfrm>
+          <a:prstGeom prst="rect">
+            <a:avLst/>
+          </a:prstGeom>
+          <a:solidFill>
+            <a:srgbClr val="0070C0"/>
+          </a:solidFill>
+          <a:ln>
+            <a:solidFill>
+              <a:srgbClr val="0070C0"/>
+            </a:solidFill>
+          </a:ln>
+          <a:effectLst/>
+        </p:spPr>
+        <p:style>
+          <a:lnRef idx="1">
+            <a:schemeClr val="accent3"/>
+          </a:lnRef>
+          <a:fillRef idx="2">
+            <a:schemeClr val="accent3"/>
+          </a:fillRef>
+          <a:effectRef idx="1">
+            <a:schemeClr val="accent3"/>
+          </a:effectRef>
+          <a:fontRef idx="minor">
+            <a:schemeClr val="dk1"/>
+          </a:fontRef>
+        </p:style>
+        <p:txBody>
+          <a:bodyPr rtlCol="0" anchor="ctr"/>
+          <a:lstStyle/>
+          <a:p>
+            <a:pPr algn="ctr"/>
+            <a:endParaRPr lang="en-SG" sz="1400" dirty="0"/>
+          </a:p>
+        </p:txBody>
+      </p:sp>
+      <p:cxnSp>
+        <p:nvCxnSpPr>
+          <p:cNvPr id="75" name="Straight Arrow Connector 74">
+            <a:extLst>
+              <a:ext uri="{FF2B5EF4-FFF2-40B4-BE49-F238E27FC236}">
+                <a16:creationId xmlns:a16="http://schemas.microsoft.com/office/drawing/2014/main" id="{ABC08DD9-B1A8-7342-A1E6-725FD51A2942}"/>
+              </a:ext>
+            </a:extLst>
+          </p:cNvPr>
+          <p:cNvCxnSpPr>
+            <a:cxnSpLocks/>
+          </p:cNvCxnSpPr>
+          <p:nvPr/>
+        </p:nvCxnSpPr>
+        <p:spPr>
+          <a:xfrm>
+            <a:off x="1763356" y="3048000"/>
+            <a:ext cx="1379111" cy="0"/>
+          </a:xfrm>
+          <a:prstGeom prst="straightConnector1">
+            <a:avLst/>
+          </a:prstGeom>
+          <a:ln w="19050">
+            <a:solidFill>
+              <a:srgbClr val="0070C0"/>
+            </a:solidFill>
+            <a:tailEnd type="arrow"/>
+          </a:ln>
+        </p:spPr>
+        <p:style>
+          <a:lnRef idx="1">
+            <a:schemeClr val="accent1"/>
+          </a:lnRef>
+          <a:fillRef idx="0">
+            <a:schemeClr val="accent1"/>
+          </a:fillRef>
+          <a:effectRef idx="0">
+            <a:schemeClr val="accent1"/>
+          </a:effectRef>
+          <a:fontRef idx="minor">
+            <a:schemeClr val="tx1"/>
+          </a:fontRef>
+        </p:style>
+      </p:cxnSp>
+      <p:cxnSp>
+        <p:nvCxnSpPr>
+          <p:cNvPr id="85" name="Straight Arrow Connector 84">
+            <a:extLst>
+              <a:ext uri="{FF2B5EF4-FFF2-40B4-BE49-F238E27FC236}">
+                <a16:creationId xmlns:a16="http://schemas.microsoft.com/office/drawing/2014/main" id="{B41F6960-7B0D-CC44-845D-9382023906EA}"/>
+              </a:ext>
+            </a:extLst>
+          </p:cNvPr>
+          <p:cNvCxnSpPr>
+            <a:cxnSpLocks/>
+          </p:cNvCxnSpPr>
+          <p:nvPr/>
+        </p:nvCxnSpPr>
+        <p:spPr>
+          <a:xfrm>
+            <a:off x="1759554" y="3886200"/>
+            <a:ext cx="1382913" cy="0"/>
+          </a:xfrm>
+          <a:prstGeom prst="straightConnector1">
+            <a:avLst/>
+          </a:prstGeom>
+          <a:ln w="19050">
+            <a:solidFill>
+              <a:srgbClr val="0070C0"/>
+            </a:solidFill>
+            <a:prstDash val="sysDash"/>
+            <a:headEnd type="arrow" w="med" len="med"/>
+            <a:tailEnd type="none" w="med" len="med"/>
+          </a:ln>
+        </p:spPr>
+        <p:style>
+          <a:lnRef idx="1">
+            <a:schemeClr val="accent1"/>
+          </a:lnRef>
+          <a:fillRef idx="0">
+            <a:schemeClr val="accent1"/>
+          </a:fillRef>
+          <a:effectRef idx="0">
+            <a:schemeClr val="accent1"/>
+          </a:effectRef>
+          <a:fontRef idx="minor">
+            <a:schemeClr val="tx1"/>
+          </a:fontRef>
+        </p:style>
+      </p:cxnSp>
+      <p:sp>
+        <p:nvSpPr>
+          <p:cNvPr id="87" name="TextBox 86">
+            <a:extLst>
+              <a:ext uri="{FF2B5EF4-FFF2-40B4-BE49-F238E27FC236}">
+                <a16:creationId xmlns:a16="http://schemas.microsoft.com/office/drawing/2014/main" id="{BD114E05-AAE0-6443-81A9-E3998D65B9E9}"/>
+              </a:ext>
+            </a:extLst>
+          </p:cNvPr>
+          <p:cNvSpPr txBox="1"/>
+          <p:nvPr/>
+        </p:nvSpPr>
+        <p:spPr>
+          <a:xfrm>
+            <a:off x="1780264" y="3115596"/>
+            <a:ext cx="1338532" cy="215444"/>
+          </a:xfrm>
+          <a:prstGeom prst="rect">
+            <a:avLst/>
+          </a:prstGeom>
+          <a:noFill/>
+        </p:spPr>
+        <p:txBody>
+          <a:bodyPr wrap="square" lIns="0" tIns="0" rIns="0" bIns="0" rtlCol="0">
+            <a:spAutoFit/>
+          </a:bodyPr>
+          <a:lstStyle>
+            <a:defPPr>
+              <a:defRPr lang="en-US"/>
+            </a:defPPr>
+            <a:lvl1pPr algn="r">
+              <a:defRPr sz="1400">
+                <a:solidFill>
+                  <a:srgbClr val="0070C0"/>
+                </a:solidFill>
+              </a:defRPr>
+            </a:lvl1pPr>
+          </a:lstStyle>
+          <a:p>
+            <a:pPr algn="ctr"/>
+            <a:r>
+              <a:rPr lang="en-US" dirty="0"/>
+              <a:t>parse(c/MA1521)</a:t>
+            </a:r>
           </a:p>
         </p:txBody>
       </p:sp>

</xml_diff>

<commit_message>
Update Developer Guide (#208)
* Rename event class

* DeleteSequenceDiagram.pptx: Adjust arrow positions

* Add sequence diagrams for goto and find commands

* Rename usages of events

* DeveloperGuide.adoc: Update existing and add new descriptions

Update descriptions for delete command and add new descriptions for find and goto commands

* Add new sequence diagram imgs and update delete sequence diagram img

* DeveloperGuide.adoc: Add new images
</commit_message>
<xml_diff>
--- a/docs/diagrams/DeleteSequenceDiagram.pptx
+++ b/docs/diagrams/DeleteSequenceDiagram.pptx
@@ -208,7 +208,7 @@
           <a:p>
             <a:fld id="{F5CC4B3F-88C1-4FFA-B1B6-F41C21DC6924}" type="datetimeFigureOut">
               <a:rPr lang="en-US" smtClean="0"/>
-              <a:t>10/29/18</a:t>
+              <a:t>11/10/18</a:t>
             </a:fld>
             <a:endParaRPr lang="en-US"/>
           </a:p>
@@ -738,7 +738,7 @@
           <a:p>
             <a:fld id="{78C97017-6FC3-485B-9764-EAC9E56C1D49}" type="datetimeFigureOut">
               <a:rPr lang="en-US" smtClean="0"/>
-              <a:t>10/29/18</a:t>
+              <a:t>11/10/18</a:t>
             </a:fld>
             <a:endParaRPr lang="en-US"/>
           </a:p>
@@ -906,7 +906,7 @@
           <a:p>
             <a:fld id="{78C97017-6FC3-485B-9764-EAC9E56C1D49}" type="datetimeFigureOut">
               <a:rPr lang="en-US" smtClean="0"/>
-              <a:t>10/29/18</a:t>
+              <a:t>11/10/18</a:t>
             </a:fld>
             <a:endParaRPr lang="en-US"/>
           </a:p>
@@ -1084,7 +1084,7 @@
           <a:p>
             <a:fld id="{78C97017-6FC3-485B-9764-EAC9E56C1D49}" type="datetimeFigureOut">
               <a:rPr lang="en-US" smtClean="0"/>
-              <a:t>10/29/18</a:t>
+              <a:t>11/10/18</a:t>
             </a:fld>
             <a:endParaRPr lang="en-US"/>
           </a:p>
@@ -1252,7 +1252,7 @@
           <a:p>
             <a:fld id="{78C97017-6FC3-485B-9764-EAC9E56C1D49}" type="datetimeFigureOut">
               <a:rPr lang="en-US" smtClean="0"/>
-              <a:t>10/29/18</a:t>
+              <a:t>11/10/18</a:t>
             </a:fld>
             <a:endParaRPr lang="en-US"/>
           </a:p>
@@ -1497,7 +1497,7 @@
           <a:p>
             <a:fld id="{78C97017-6FC3-485B-9764-EAC9E56C1D49}" type="datetimeFigureOut">
               <a:rPr lang="en-US" smtClean="0"/>
-              <a:t>10/29/18</a:t>
+              <a:t>11/10/18</a:t>
             </a:fld>
             <a:endParaRPr lang="en-US"/>
           </a:p>
@@ -1782,7 +1782,7 @@
           <a:p>
             <a:fld id="{78C97017-6FC3-485B-9764-EAC9E56C1D49}" type="datetimeFigureOut">
               <a:rPr lang="en-US" smtClean="0"/>
-              <a:t>10/29/18</a:t>
+              <a:t>11/10/18</a:t>
             </a:fld>
             <a:endParaRPr lang="en-US"/>
           </a:p>
@@ -2201,7 +2201,7 @@
           <a:p>
             <a:fld id="{78C97017-6FC3-485B-9764-EAC9E56C1D49}" type="datetimeFigureOut">
               <a:rPr lang="en-US" smtClean="0"/>
-              <a:t>10/29/18</a:t>
+              <a:t>11/10/18</a:t>
             </a:fld>
             <a:endParaRPr lang="en-US"/>
           </a:p>
@@ -2318,7 +2318,7 @@
           <a:p>
             <a:fld id="{78C97017-6FC3-485B-9764-EAC9E56C1D49}" type="datetimeFigureOut">
               <a:rPr lang="en-US" smtClean="0"/>
-              <a:t>10/29/18</a:t>
+              <a:t>11/10/18</a:t>
             </a:fld>
             <a:endParaRPr lang="en-US"/>
           </a:p>
@@ -2413,7 +2413,7 @@
           <a:p>
             <a:fld id="{78C97017-6FC3-485B-9764-EAC9E56C1D49}" type="datetimeFigureOut">
               <a:rPr lang="en-US" smtClean="0"/>
-              <a:t>10/29/18</a:t>
+              <a:t>11/10/18</a:t>
             </a:fld>
             <a:endParaRPr lang="en-US"/>
           </a:p>
@@ -2688,7 +2688,7 @@
           <a:p>
             <a:fld id="{78C97017-6FC3-485B-9764-EAC9E56C1D49}" type="datetimeFigureOut">
               <a:rPr lang="en-US" smtClean="0"/>
-              <a:t>10/29/18</a:t>
+              <a:t>11/10/18</a:t>
             </a:fld>
             <a:endParaRPr lang="en-US"/>
           </a:p>
@@ -2940,7 +2940,7 @@
           <a:p>
             <a:fld id="{78C97017-6FC3-485B-9764-EAC9E56C1D49}" type="datetimeFigureOut">
               <a:rPr lang="en-US" smtClean="0"/>
-              <a:t>10/29/18</a:t>
+              <a:t>11/10/18</a:t>
             </a:fld>
             <a:endParaRPr lang="en-US"/>
           </a:p>
@@ -3151,7 +3151,7 @@
           <a:p>
             <a:fld id="{78C97017-6FC3-485B-9764-EAC9E56C1D49}" type="datetimeFigureOut">
               <a:rPr lang="en-US" smtClean="0"/>
-              <a:t>10/29/18</a:t>
+              <a:t>11/10/18</a:t>
             </a:fld>
             <a:endParaRPr lang="en-US"/>
           </a:p>
@@ -5025,8 +5025,8 @@
         </p:nvCxnSpPr>
         <p:spPr>
           <a:xfrm flipV="1">
-            <a:off x="-370860" y="4633191"/>
-            <a:ext cx="4563689" cy="9715"/>
+            <a:off x="-370860" y="4639812"/>
+            <a:ext cx="4577871" cy="3095"/>
           </a:xfrm>
           <a:prstGeom prst="straightConnector1">
             <a:avLst/>
@@ -5859,13 +5859,12 @@
           </p:cNvPr>
           <p:cNvCxnSpPr>
             <a:cxnSpLocks/>
-            <a:endCxn id="59" idx="1"/>
           </p:cNvCxnSpPr>
           <p:nvPr/>
         </p:nvCxnSpPr>
         <p:spPr>
           <a:xfrm>
-            <a:off x="1759554" y="2459944"/>
+            <a:off x="1762803" y="2488629"/>
             <a:ext cx="524859" cy="2805"/>
           </a:xfrm>
           <a:prstGeom prst="straightConnector1">
@@ -6054,8 +6053,8 @@
         </p:nvCxnSpPr>
         <p:spPr>
           <a:xfrm>
-            <a:off x="1763356" y="3048000"/>
-            <a:ext cx="1379111" cy="0"/>
+            <a:off x="1748548" y="3024893"/>
+            <a:ext cx="1420136" cy="0"/>
           </a:xfrm>
           <a:prstGeom prst="straightConnector1">
             <a:avLst/>

</xml_diff>